<commit_message>
A lot os shapes changed
</commit_message>
<xml_diff>
--- a/journalSwarmControl/pictures/pdf/SetUp.pptx
+++ b/journalSwarmControl/pictures/pdf/SetUp.pptx
@@ -288,7 +288,7 @@
           <a:p>
             <a:fld id="{F694978D-A894-E24D-9868-C9A03761E7E6}" type="datetimeFigureOut">
               <a:rPr lang="en-US" smtClean="0"/>
-              <a:t>8/4/2016</a:t>
+              <a:t>8/9/2016</a:t>
             </a:fld>
             <a:endParaRPr lang="en-US"/>
           </a:p>
@@ -458,7 +458,7 @@
           <a:p>
             <a:fld id="{F694978D-A894-E24D-9868-C9A03761E7E6}" type="datetimeFigureOut">
               <a:rPr lang="en-US" smtClean="0"/>
-              <a:t>8/4/2016</a:t>
+              <a:t>8/9/2016</a:t>
             </a:fld>
             <a:endParaRPr lang="en-US"/>
           </a:p>
@@ -638,7 +638,7 @@
           <a:p>
             <a:fld id="{F694978D-A894-E24D-9868-C9A03761E7E6}" type="datetimeFigureOut">
               <a:rPr lang="en-US" smtClean="0"/>
-              <a:t>8/4/2016</a:t>
+              <a:t>8/9/2016</a:t>
             </a:fld>
             <a:endParaRPr lang="en-US"/>
           </a:p>
@@ -808,7 +808,7 @@
           <a:p>
             <a:fld id="{F694978D-A894-E24D-9868-C9A03761E7E6}" type="datetimeFigureOut">
               <a:rPr lang="en-US" smtClean="0"/>
-              <a:t>8/4/2016</a:t>
+              <a:t>8/9/2016</a:t>
             </a:fld>
             <a:endParaRPr lang="en-US"/>
           </a:p>
@@ -1054,7 +1054,7 @@
           <a:p>
             <a:fld id="{F694978D-A894-E24D-9868-C9A03761E7E6}" type="datetimeFigureOut">
               <a:rPr lang="en-US" smtClean="0"/>
-              <a:t>8/4/2016</a:t>
+              <a:t>8/9/2016</a:t>
             </a:fld>
             <a:endParaRPr lang="en-US"/>
           </a:p>
@@ -1342,7 +1342,7 @@
           <a:p>
             <a:fld id="{F694978D-A894-E24D-9868-C9A03761E7E6}" type="datetimeFigureOut">
               <a:rPr lang="en-US" smtClean="0"/>
-              <a:t>8/4/2016</a:t>
+              <a:t>8/9/2016</a:t>
             </a:fld>
             <a:endParaRPr lang="en-US"/>
           </a:p>
@@ -1764,7 +1764,7 @@
           <a:p>
             <a:fld id="{F694978D-A894-E24D-9868-C9A03761E7E6}" type="datetimeFigureOut">
               <a:rPr lang="en-US" smtClean="0"/>
-              <a:t>8/4/2016</a:t>
+              <a:t>8/9/2016</a:t>
             </a:fld>
             <a:endParaRPr lang="en-US"/>
           </a:p>
@@ -1882,7 +1882,7 @@
           <a:p>
             <a:fld id="{F694978D-A894-E24D-9868-C9A03761E7E6}" type="datetimeFigureOut">
               <a:rPr lang="en-US" smtClean="0"/>
-              <a:t>8/4/2016</a:t>
+              <a:t>8/9/2016</a:t>
             </a:fld>
             <a:endParaRPr lang="en-US"/>
           </a:p>
@@ -1977,7 +1977,7 @@
           <a:p>
             <a:fld id="{F694978D-A894-E24D-9868-C9A03761E7E6}" type="datetimeFigureOut">
               <a:rPr lang="en-US" smtClean="0"/>
-              <a:t>8/4/2016</a:t>
+              <a:t>8/9/2016</a:t>
             </a:fld>
             <a:endParaRPr lang="en-US"/>
           </a:p>
@@ -2254,7 +2254,7 @@
           <a:p>
             <a:fld id="{F694978D-A894-E24D-9868-C9A03761E7E6}" type="datetimeFigureOut">
               <a:rPr lang="en-US" smtClean="0"/>
-              <a:t>8/4/2016</a:t>
+              <a:t>8/9/2016</a:t>
             </a:fld>
             <a:endParaRPr lang="en-US"/>
           </a:p>
@@ -2507,7 +2507,7 @@
           <a:p>
             <a:fld id="{F694978D-A894-E24D-9868-C9A03761E7E6}" type="datetimeFigureOut">
               <a:rPr lang="en-US" smtClean="0"/>
-              <a:t>8/4/2016</a:t>
+              <a:t>8/9/2016</a:t>
             </a:fld>
             <a:endParaRPr lang="en-US"/>
           </a:p>
@@ -2720,7 +2720,7 @@
           <a:p>
             <a:fld id="{F694978D-A894-E24D-9868-C9A03761E7E6}" type="datetimeFigureOut">
               <a:rPr lang="en-US" smtClean="0"/>
-              <a:t>8/4/2016</a:t>
+              <a:t>8/9/2016</a:t>
             </a:fld>
             <a:endParaRPr lang="en-US"/>
           </a:p>
@@ -3650,14 +3650,7 @@
                 <a:latin typeface="Times New Roman"/>
                 <a:cs typeface="Times New Roman"/>
               </a:rPr>
-              <a:t>50W </a:t>
-            </a:r>
-            <a:r>
-              <a:rPr lang="en-US" dirty="0" smtClean="0">
-                <a:latin typeface="Times New Roman"/>
-                <a:cs typeface="Times New Roman"/>
-              </a:rPr>
-              <a:t>LED Lights</a:t>
+              <a:t>50W LED Lights</a:t>
             </a:r>
             <a:endParaRPr lang="en-US" dirty="0">
               <a:latin typeface="Times New Roman"/>
@@ -3753,6 +3746,11 @@
           <a:prstGeom prst="cube">
             <a:avLst/>
           </a:prstGeom>
+          <a:solidFill>
+            <a:schemeClr val="bg1">
+              <a:lumMod val="75000"/>
+            </a:schemeClr>
+          </a:solidFill>
         </p:spPr>
         <p:style>
           <a:lnRef idx="2">
@@ -3793,6 +3791,11 @@
               <a:gd name="adj" fmla="val 23937"/>
             </a:avLst>
           </a:prstGeom>
+          <a:solidFill>
+            <a:schemeClr val="bg1">
+              <a:lumMod val="75000"/>
+            </a:schemeClr>
+          </a:solidFill>
         </p:spPr>
         <p:style>
           <a:lnRef idx="2">
@@ -4061,6 +4064,11 @@
               <a:gd name="adj" fmla="val 23937"/>
             </a:avLst>
           </a:prstGeom>
+          <a:solidFill>
+            <a:schemeClr val="bg1">
+              <a:lumMod val="75000"/>
+            </a:schemeClr>
+          </a:solidFill>
         </p:spPr>
         <p:style>
           <a:lnRef idx="2">
@@ -4099,6 +4107,11 @@
           <a:prstGeom prst="cube">
             <a:avLst/>
           </a:prstGeom>
+          <a:solidFill>
+            <a:schemeClr val="bg1">
+              <a:lumMod val="75000"/>
+            </a:schemeClr>
+          </a:solidFill>
         </p:spPr>
         <p:style>
           <a:lnRef idx="2">

</xml_diff>